<commit_message>
Petit push de safety
hihi
</commit_message>
<xml_diff>
--- a/Final/Presentation_Equipe9.pptx
+++ b/Final/Presentation_Equipe9.pptx
@@ -17,14 +17,17 @@
     <p:sldId id="269" r:id="rId11"/>
     <p:sldId id="270" r:id="rId12"/>
     <p:sldId id="271" r:id="rId13"/>
-    <p:sldId id="272" r:id="rId14"/>
-    <p:sldId id="266" r:id="rId15"/>
-    <p:sldId id="273" r:id="rId16"/>
-    <p:sldId id="274" r:id="rId17"/>
-    <p:sldId id="275" r:id="rId18"/>
-    <p:sldId id="276" r:id="rId19"/>
-    <p:sldId id="277" r:id="rId20"/>
-    <p:sldId id="278" r:id="rId21"/>
+    <p:sldId id="279" r:id="rId14"/>
+    <p:sldId id="280" r:id="rId15"/>
+    <p:sldId id="281" r:id="rId16"/>
+    <p:sldId id="272" r:id="rId17"/>
+    <p:sldId id="266" r:id="rId18"/>
+    <p:sldId id="273" r:id="rId19"/>
+    <p:sldId id="274" r:id="rId20"/>
+    <p:sldId id="275" r:id="rId21"/>
+    <p:sldId id="276" r:id="rId22"/>
+    <p:sldId id="277" r:id="rId23"/>
+    <p:sldId id="278" r:id="rId24"/>
   </p:sldIdLst>
   <p:sldSz cx="12192000" cy="6858000"/>
   <p:notesSz cx="6858000" cy="9144000"/>
@@ -375,7 +378,7 @@
           <a:p>
             <a:fld id="{9184DA70-C731-4C70-880D-CCD4705E623C}" type="datetime1">
               <a:rPr lang="en-US" smtClean="0"/>
-              <a:t>4/15/2023</a:t>
+              <a:t>4/16/2023</a:t>
             </a:fld>
             <a:endParaRPr lang="en-US" dirty="0"/>
           </a:p>
@@ -563,7 +566,7 @@
           <a:p>
             <a:fld id="{B612A279-0833-481D-8C56-F67FD0AC6C50}" type="datetime1">
               <a:rPr lang="en-US" smtClean="0"/>
-              <a:t>4/15/2023</a:t>
+              <a:t>4/16/2023</a:t>
             </a:fld>
             <a:endParaRPr lang="en-US" dirty="0"/>
           </a:p>
@@ -805,7 +808,7 @@
           <a:p>
             <a:fld id="{6587DA83-5663-4C9C-B9AA-0B40A3DAFF81}" type="datetime1">
               <a:rPr lang="en-US" smtClean="0"/>
-              <a:t>4/15/2023</a:t>
+              <a:t>4/16/2023</a:t>
             </a:fld>
             <a:endParaRPr lang="en-US" dirty="0"/>
           </a:p>
@@ -993,7 +996,7 @@
           <a:p>
             <a:fld id="{4BE1D723-8F53-4F53-90B0-1982A396982E}" type="datetime1">
               <a:rPr lang="en-US" smtClean="0"/>
-              <a:t>4/15/2023</a:t>
+              <a:t>4/16/2023</a:t>
             </a:fld>
             <a:endParaRPr lang="en-US" dirty="0"/>
           </a:p>
@@ -1366,7 +1369,7 @@
           <a:p>
             <a:fld id="{97669AF7-7BEB-44E4-9852-375E34362B5B}" type="datetime1">
               <a:rPr lang="en-US" smtClean="0"/>
-              <a:t>4/15/2023</a:t>
+              <a:t>4/16/2023</a:t>
             </a:fld>
             <a:endParaRPr lang="en-US" dirty="0"/>
           </a:p>
@@ -1621,7 +1624,7 @@
           <a:p>
             <a:fld id="{BAAAC38D-0552-4C82-B593-E6124DFADBE2}" type="datetime1">
               <a:rPr lang="en-US" smtClean="0"/>
-              <a:t>4/15/2023</a:t>
+              <a:t>4/16/2023</a:t>
             </a:fld>
             <a:endParaRPr lang="en-US" dirty="0"/>
           </a:p>
@@ -2018,7 +2021,7 @@
           <a:p>
             <a:fld id="{D9DF0F1C-5577-4ACB-BB62-DF8F3C494C7E}" type="datetime1">
               <a:rPr lang="en-US" smtClean="0"/>
-              <a:t>4/15/2023</a:t>
+              <a:t>4/16/2023</a:t>
             </a:fld>
             <a:endParaRPr lang="en-US" dirty="0"/>
           </a:p>
@@ -2154,7 +2157,7 @@
           <a:p>
             <a:fld id="{1775B394-D9F9-4F0C-B15D-605F45CB9E9F}" type="datetime1">
               <a:rPr lang="en-US" smtClean="0"/>
-              <a:t>4/15/2023</a:t>
+              <a:t>4/16/2023</a:t>
             </a:fld>
             <a:endParaRPr lang="en-US" dirty="0"/>
           </a:p>
@@ -2311,7 +2314,7 @@
           <a:p>
             <a:fld id="{39667345-2558-425A-8533-9BFDBCE15005}" type="datetime1">
               <a:rPr lang="en-US" smtClean="0"/>
-              <a:t>4/15/2023</a:t>
+              <a:t>4/16/2023</a:t>
             </a:fld>
             <a:endParaRPr lang="en-US" dirty="0"/>
           </a:p>
@@ -2640,7 +2643,7 @@
           <a:p>
             <a:fld id="{92BEA474-078D-4E9B-9B14-09A87B19DC46}" type="datetime1">
               <a:rPr lang="en-US" smtClean="0"/>
-              <a:t>4/15/2023</a:t>
+              <a:t>4/16/2023</a:t>
             </a:fld>
             <a:endParaRPr lang="en-US" dirty="0"/>
           </a:p>
@@ -2990,7 +2993,7 @@
           <a:p>
             <a:fld id="{4907D986-8816-4272-A432-0437A28A9828}" type="datetime1">
               <a:rPr lang="en-US" smtClean="0"/>
-              <a:t>4/15/2023</a:t>
+              <a:t>4/16/2023</a:t>
             </a:fld>
             <a:endParaRPr lang="en-US" dirty="0"/>
           </a:p>
@@ -3251,7 +3254,7 @@
           <a:p>
             <a:fld id="{62D6E202-B606-4609-B914-27C9371A1F6D}" type="datetime1">
               <a:rPr lang="en-US" smtClean="0"/>
-              <a:t>4/15/2023</a:t>
+              <a:t>4/16/2023</a:t>
             </a:fld>
             <a:endParaRPr lang="en-US" dirty="0"/>
           </a:p>
@@ -4135,9 +4138,16 @@
             <p:ph type="title"/>
           </p:nvPr>
         </p:nvSpPr>
-        <p:spPr/>
-        <p:txBody>
-          <a:bodyPr/>
+        <p:spPr>
+          <a:xfrm>
+            <a:off x="1097280" y="286603"/>
+            <a:ext cx="10058400" cy="1450757"/>
+          </a:xfrm>
+        </p:spPr>
+        <p:txBody>
+          <a:bodyPr anchor="b">
+            <a:normAutofit/>
+          </a:bodyPr>
           <a:lstStyle/>
           <a:p>
             <a:r>
@@ -4150,29 +4160,148 @@
       </p:sp>
       <p:sp>
         <p:nvSpPr>
-          <p:cNvPr id="3" name="Content Placeholder 2">
-            <a:extLst>
-              <a:ext uri="{FF2B5EF4-FFF2-40B4-BE49-F238E27FC236}">
-                <a16:creationId xmlns:a16="http://schemas.microsoft.com/office/drawing/2014/main" id="{9983E910-59CB-7ECB-46A9-68D73D0A7492}"/>
-              </a:ext>
-            </a:extLst>
-          </p:cNvPr>
-          <p:cNvSpPr>
-            <a:spLocks noGrp="1"/>
-          </p:cNvSpPr>
-          <p:nvPr>
-            <p:ph idx="1"/>
-          </p:nvPr>
-        </p:nvSpPr>
-        <p:spPr/>
-        <p:txBody>
-          <a:bodyPr/>
-          <a:lstStyle/>
-          <a:p>
-            <a:endParaRPr lang="en-CA" dirty="0"/>
-          </a:p>
-        </p:txBody>
-      </p:sp>
+          <p:cNvPr id="10" name="Content Placeholder 2">
+            <a:extLst>
+              <a:ext uri="{FF2B5EF4-FFF2-40B4-BE49-F238E27FC236}">
+                <a16:creationId xmlns:a16="http://schemas.microsoft.com/office/drawing/2014/main" id="{37229E06-B02E-7EE2-4DE0-B8DB8EC19592}"/>
+              </a:ext>
+            </a:extLst>
+          </p:cNvPr>
+          <p:cNvSpPr>
+            <a:spLocks noGrp="1"/>
+          </p:cNvSpPr>
+          <p:nvPr>
+            <p:ph sz="half" idx="1"/>
+          </p:nvPr>
+        </p:nvSpPr>
+        <p:spPr>
+          <a:xfrm>
+            <a:off x="1097280" y="2120900"/>
+            <a:ext cx="4639736" cy="3748193"/>
+          </a:xfrm>
+        </p:spPr>
+        <p:txBody>
+          <a:bodyPr anchor="ctr"/>
+          <a:lstStyle/>
+          <a:p>
+            <a:pPr>
+              <a:buFont typeface="Wingdings" panose="05000000000000000000" pitchFamily="2" charset="2"/>
+              <a:buChar char="q"/>
+            </a:pPr>
+            <a:r>
+              <a:rPr lang="en-US" dirty="0"/>
+              <a:t> </a:t>
+            </a:r>
+            <a:r>
+              <a:rPr lang="en-US" dirty="0" err="1"/>
+              <a:t>L’hyperparamètre</a:t>
+            </a:r>
+            <a:r>
+              <a:rPr lang="en-US" dirty="0"/>
+              <a:t> k </a:t>
+            </a:r>
+            <a:r>
+              <a:rPr lang="en-US" dirty="0" err="1"/>
+              <a:t>est</a:t>
+            </a:r>
+            <a:r>
+              <a:rPr lang="en-US" dirty="0"/>
+              <a:t> </a:t>
+            </a:r>
+            <a:r>
+              <a:rPr lang="en-US" dirty="0" err="1"/>
+              <a:t>optimisé</a:t>
+            </a:r>
+            <a:r>
+              <a:rPr lang="en-US" dirty="0"/>
+              <a:t> par la </a:t>
+            </a:r>
+            <a:r>
+              <a:rPr lang="en-US" dirty="0" err="1"/>
+              <a:t>méthode</a:t>
+            </a:r>
+            <a:r>
+              <a:rPr lang="en-US" dirty="0"/>
+              <a:t> de </a:t>
+            </a:r>
+            <a:r>
+              <a:rPr lang="en-US" dirty="0" err="1"/>
+              <a:t>l’EQM</a:t>
+            </a:r>
+            <a:endParaRPr lang="en-US" dirty="0"/>
+          </a:p>
+          <a:p>
+            <a:pPr>
+              <a:buFont typeface="Wingdings" panose="05000000000000000000" pitchFamily="2" charset="2"/>
+              <a:buChar char="q"/>
+            </a:pPr>
+            <a:r>
+              <a:rPr lang="en-US" dirty="0"/>
+              <a:t> La </a:t>
+            </a:r>
+            <a:r>
+              <a:rPr lang="en-US" dirty="0" err="1"/>
+              <a:t>valeur</a:t>
+            </a:r>
+            <a:r>
+              <a:rPr lang="en-US" dirty="0"/>
+              <a:t> </a:t>
+            </a:r>
+            <a:r>
+              <a:rPr lang="en-US" dirty="0" err="1"/>
+              <a:t>optimale</a:t>
+            </a:r>
+            <a:r>
+              <a:rPr lang="en-US" dirty="0"/>
+              <a:t> de K </a:t>
+            </a:r>
+            <a:r>
+              <a:rPr lang="en-US" dirty="0" err="1"/>
+              <a:t>est</a:t>
+            </a:r>
+            <a:r>
+              <a:rPr lang="en-US" dirty="0"/>
+              <a:t> 15</a:t>
+            </a:r>
+          </a:p>
+        </p:txBody>
+      </p:sp>
+      <p:pic>
+        <p:nvPicPr>
+          <p:cNvPr id="5" name="Content Placeholder 4" descr="Chart, histogram&#10;&#10;Description automatically generated">
+            <a:extLst>
+              <a:ext uri="{FF2B5EF4-FFF2-40B4-BE49-F238E27FC236}">
+                <a16:creationId xmlns:a16="http://schemas.microsoft.com/office/drawing/2014/main" id="{F2B9272C-BDE5-B03C-B819-8ED17EAD29B8}"/>
+              </a:ext>
+            </a:extLst>
+          </p:cNvPr>
+          <p:cNvPicPr>
+            <a:picLocks noGrp="1" noChangeAspect="1"/>
+          </p:cNvPicPr>
+          <p:nvPr>
+            <p:ph sz="half" idx="2"/>
+          </p:nvPr>
+        </p:nvPicPr>
+        <p:blipFill>
+          <a:blip r:embed="rId2">
+            <a:extLst>
+              <a:ext uri="{28A0092B-C50C-407E-A947-70E740481C1C}">
+                <a14:useLocalDpi xmlns:a14="http://schemas.microsoft.com/office/drawing/2010/main" val="0"/>
+              </a:ext>
+            </a:extLst>
+          </a:blip>
+          <a:stretch>
+            <a:fillRect/>
+          </a:stretch>
+        </p:blipFill>
+        <p:spPr>
+          <a:xfrm>
+            <a:off x="5916652" y="2316480"/>
+            <a:ext cx="5601252" cy="3220720"/>
+          </a:xfrm>
+          <a:noFill/>
+        </p:spPr>
+      </p:pic>
     </p:spTree>
     <p:extLst>
       <p:ext uri="{BB962C8B-B14F-4D97-AF65-F5344CB8AC3E}">
@@ -4526,9 +4655,36 @@
         </p:nvSpPr>
         <p:spPr/>
         <p:txBody>
-          <a:bodyPr/>
-          <a:lstStyle/>
-          <a:p>
+          <a:bodyPr anchor="ctr"/>
+          <a:lstStyle/>
+          <a:p>
+            <a:pPr marL="0" indent="0">
+              <a:buNone/>
+            </a:pPr>
+            <a:r>
+              <a:rPr lang="fr-CA" dirty="0"/>
+              <a:t>Il y a deux hyperparamètres à optimiser dans le cas du bagging: </a:t>
+            </a:r>
+          </a:p>
+          <a:p>
+            <a:pPr>
+              <a:buFont typeface="Wingdings" panose="05000000000000000000" pitchFamily="2" charset="2"/>
+              <a:buChar char="q"/>
+            </a:pPr>
+            <a:r>
+              <a:rPr lang="fr-CA" dirty="0"/>
+              <a:t> B : Nombre d’arbres</a:t>
+            </a:r>
+          </a:p>
+          <a:p>
+            <a:pPr>
+              <a:buFont typeface="Wingdings" panose="05000000000000000000" pitchFamily="2" charset="2"/>
+              <a:buChar char="q"/>
+            </a:pPr>
+            <a:r>
+              <a:rPr lang="fr-CA" dirty="0"/>
+              <a:t> n : Nombre d’observations minimal dans un nœud terminal</a:t>
+            </a:r>
             <a:endParaRPr lang="en-CA" dirty="0"/>
           </a:p>
         </p:txBody>
@@ -4579,14 +4735,21 @@
             <p:ph type="title"/>
           </p:nvPr>
         </p:nvSpPr>
-        <p:spPr/>
-        <p:txBody>
-          <a:bodyPr/>
+        <p:spPr>
+          <a:xfrm>
+            <a:off x="1097280" y="286603"/>
+            <a:ext cx="10058400" cy="1450757"/>
+          </a:xfrm>
+        </p:spPr>
+        <p:txBody>
+          <a:bodyPr anchor="b">
+            <a:normAutofit/>
+          </a:bodyPr>
           <a:lstStyle/>
           <a:p>
             <a:r>
               <a:rPr lang="fr-CA" dirty="0"/>
-              <a:t>Forêt aléatoire</a:t>
+              <a:t>Bagging (B)</a:t>
             </a:r>
             <a:endParaRPr lang="en-CA" dirty="0"/>
           </a:p>
@@ -4594,33 +4757,110 @@
       </p:sp>
       <p:sp>
         <p:nvSpPr>
-          <p:cNvPr id="3" name="Content Placeholder 2">
-            <a:extLst>
-              <a:ext uri="{FF2B5EF4-FFF2-40B4-BE49-F238E27FC236}">
-                <a16:creationId xmlns:a16="http://schemas.microsoft.com/office/drawing/2014/main" id="{9983E910-59CB-7ECB-46A9-68D73D0A7492}"/>
-              </a:ext>
-            </a:extLst>
-          </p:cNvPr>
-          <p:cNvSpPr>
-            <a:spLocks noGrp="1"/>
-          </p:cNvSpPr>
-          <p:nvPr>
-            <p:ph idx="1"/>
-          </p:nvPr>
-        </p:nvSpPr>
-        <p:spPr/>
-        <p:txBody>
-          <a:bodyPr/>
-          <a:lstStyle/>
-          <a:p>
-            <a:endParaRPr lang="en-CA" dirty="0"/>
-          </a:p>
-        </p:txBody>
-      </p:sp>
+          <p:cNvPr id="10" name="Content Placeholder 2">
+            <a:extLst>
+              <a:ext uri="{FF2B5EF4-FFF2-40B4-BE49-F238E27FC236}">
+                <a16:creationId xmlns:a16="http://schemas.microsoft.com/office/drawing/2014/main" id="{5717496A-A84A-29C3-A6A2-2B42359C5744}"/>
+              </a:ext>
+            </a:extLst>
+          </p:cNvPr>
+          <p:cNvSpPr>
+            <a:spLocks noGrp="1"/>
+          </p:cNvSpPr>
+          <p:nvPr>
+            <p:ph sz="half" idx="1"/>
+          </p:nvPr>
+        </p:nvSpPr>
+        <p:spPr>
+          <a:xfrm>
+            <a:off x="1097280" y="2120900"/>
+            <a:ext cx="4639736" cy="3748193"/>
+          </a:xfrm>
+        </p:spPr>
+        <p:txBody>
+          <a:bodyPr anchor="ctr"/>
+          <a:lstStyle/>
+          <a:p>
+            <a:pPr>
+              <a:buFont typeface="Wingdings" panose="05000000000000000000" pitchFamily="2" charset="2"/>
+              <a:buChar char="q"/>
+            </a:pPr>
+            <a:r>
+              <a:rPr lang="en-US" dirty="0"/>
+              <a:t> Le RMSE </a:t>
+            </a:r>
+            <a:r>
+              <a:rPr lang="en-US" dirty="0" err="1"/>
+              <a:t>semble</a:t>
+            </a:r>
+            <a:r>
+              <a:rPr lang="en-US" dirty="0"/>
+              <a:t> se </a:t>
+            </a:r>
+            <a:r>
+              <a:rPr lang="en-US" dirty="0" err="1"/>
+              <a:t>stabiliser</a:t>
+            </a:r>
+            <a:r>
+              <a:rPr lang="en-US" dirty="0"/>
+              <a:t> à </a:t>
+            </a:r>
+            <a:r>
+              <a:rPr lang="en-US" dirty="0" err="1"/>
+              <a:t>partir</a:t>
+            </a:r>
+            <a:r>
+              <a:rPr lang="en-US" dirty="0"/>
+              <a:t> de 200 </a:t>
+            </a:r>
+            <a:r>
+              <a:rPr lang="en-US" dirty="0" err="1"/>
+              <a:t>arbres</a:t>
+            </a:r>
+            <a:endParaRPr lang="en-US" dirty="0"/>
+          </a:p>
+        </p:txBody>
+      </p:sp>
+      <p:pic>
+        <p:nvPicPr>
+          <p:cNvPr id="5" name="Content Placeholder 4" descr="Chart, line chart&#10;&#10;Description automatically generated">
+            <a:extLst>
+              <a:ext uri="{FF2B5EF4-FFF2-40B4-BE49-F238E27FC236}">
+                <a16:creationId xmlns:a16="http://schemas.microsoft.com/office/drawing/2014/main" id="{DDD09B35-93C1-8117-29EA-882EAF04438B}"/>
+              </a:ext>
+            </a:extLst>
+          </p:cNvPr>
+          <p:cNvPicPr>
+            <a:picLocks noGrp="1" noChangeAspect="1"/>
+          </p:cNvPicPr>
+          <p:nvPr>
+            <p:ph sz="half" idx="2"/>
+          </p:nvPr>
+        </p:nvPicPr>
+        <p:blipFill>
+          <a:blip r:embed="rId2">
+            <a:extLst>
+              <a:ext uri="{28A0092B-C50C-407E-A947-70E740481C1C}">
+                <a14:useLocalDpi xmlns:a14="http://schemas.microsoft.com/office/drawing/2010/main" val="0"/>
+              </a:ext>
+            </a:extLst>
+          </a:blip>
+          <a:stretch>
+            <a:fillRect/>
+          </a:stretch>
+        </p:blipFill>
+        <p:spPr>
+          <a:xfrm>
+            <a:off x="6002391" y="2245360"/>
+            <a:ext cx="5868395" cy="3623733"/>
+          </a:xfrm>
+          <a:noFill/>
+        </p:spPr>
+      </p:pic>
     </p:spTree>
     <p:extLst>
       <p:ext uri="{BB962C8B-B14F-4D97-AF65-F5344CB8AC3E}">
-        <p14:creationId xmlns:p14="http://schemas.microsoft.com/office/powerpoint/2010/main" val="1102128177"/>
+        <p14:creationId xmlns:p14="http://schemas.microsoft.com/office/powerpoint/2010/main" val="3290440754"/>
       </p:ext>
     </p:extLst>
   </p:cSld>
@@ -4663,52 +4903,65 @@
             <p:ph type="title"/>
           </p:nvPr>
         </p:nvSpPr>
-        <p:spPr/>
-        <p:txBody>
-          <a:bodyPr/>
+        <p:spPr>
+          <a:xfrm>
+            <a:off x="1097280" y="286603"/>
+            <a:ext cx="10058400" cy="1450757"/>
+          </a:xfrm>
+        </p:spPr>
+        <p:txBody>
+          <a:bodyPr anchor="b">
+            <a:normAutofit/>
+          </a:bodyPr>
           <a:lstStyle/>
           <a:p>
             <a:r>
               <a:rPr lang="fr-CA" dirty="0"/>
-              <a:t>Gradient </a:t>
-            </a:r>
-            <a:r>
-              <a:rPr lang="fr-CA" dirty="0" err="1"/>
-              <a:t>Boosting</a:t>
+              <a:t>Bagging (n)</a:t>
             </a:r>
             <a:endParaRPr lang="en-CA" dirty="0"/>
           </a:p>
         </p:txBody>
       </p:sp>
-      <p:sp>
-        <p:nvSpPr>
-          <p:cNvPr id="3" name="Content Placeholder 2">
-            <a:extLst>
-              <a:ext uri="{FF2B5EF4-FFF2-40B4-BE49-F238E27FC236}">
-                <a16:creationId xmlns:a16="http://schemas.microsoft.com/office/drawing/2014/main" id="{9983E910-59CB-7ECB-46A9-68D73D0A7492}"/>
-              </a:ext>
-            </a:extLst>
-          </p:cNvPr>
-          <p:cNvSpPr>
-            <a:spLocks noGrp="1"/>
-          </p:cNvSpPr>
-          <p:nvPr>
-            <p:ph idx="1"/>
-          </p:nvPr>
-        </p:nvSpPr>
-        <p:spPr/>
-        <p:txBody>
-          <a:bodyPr/>
-          <a:lstStyle/>
-          <a:p>
-            <a:endParaRPr lang="en-CA" dirty="0"/>
-          </a:p>
-        </p:txBody>
-      </p:sp>
+      <p:pic>
+        <p:nvPicPr>
+          <p:cNvPr id="9" name="Content Placeholder 8" descr="Chart, line chart&#10;&#10;Description automatically generated">
+            <a:extLst>
+              <a:ext uri="{FF2B5EF4-FFF2-40B4-BE49-F238E27FC236}">
+                <a16:creationId xmlns:a16="http://schemas.microsoft.com/office/drawing/2014/main" id="{E82DDABB-FD38-FBDE-3C56-22EF89005BA1}"/>
+              </a:ext>
+            </a:extLst>
+          </p:cNvPr>
+          <p:cNvPicPr>
+            <a:picLocks noGrp="1" noChangeAspect="1"/>
+          </p:cNvPicPr>
+          <p:nvPr>
+            <p:ph sz="half" idx="1"/>
+          </p:nvPr>
+        </p:nvPicPr>
+        <p:blipFill>
+          <a:blip r:embed="rId2">
+            <a:extLst>
+              <a:ext uri="{28A0092B-C50C-407E-A947-70E740481C1C}">
+                <a14:useLocalDpi xmlns:a14="http://schemas.microsoft.com/office/drawing/2010/main" val="0"/>
+              </a:ext>
+            </a:extLst>
+          </a:blip>
+          <a:stretch>
+            <a:fillRect/>
+          </a:stretch>
+        </p:blipFill>
+        <p:spPr>
+          <a:xfrm>
+            <a:off x="3093641" y="2267388"/>
+            <a:ext cx="6004718" cy="3708521"/>
+          </a:xfrm>
+        </p:spPr>
+      </p:pic>
     </p:spTree>
     <p:extLst>
       <p:ext uri="{BB962C8B-B14F-4D97-AF65-F5344CB8AC3E}">
-        <p14:creationId xmlns:p14="http://schemas.microsoft.com/office/powerpoint/2010/main" val="1655170980"/>
+        <p14:creationId xmlns:p14="http://schemas.microsoft.com/office/powerpoint/2010/main" val="2702353695"/>
       </p:ext>
     </p:extLst>
   </p:cSld>
@@ -4740,7 +4993,7 @@
           <p:cNvPr id="2" name="Title 1">
             <a:extLst>
               <a:ext uri="{FF2B5EF4-FFF2-40B4-BE49-F238E27FC236}">
-                <a16:creationId xmlns:a16="http://schemas.microsoft.com/office/drawing/2014/main" id="{94951D72-9FC3-B808-3CC4-B291E4C2CC30}"/>
+                <a16:creationId xmlns:a16="http://schemas.microsoft.com/office/drawing/2014/main" id="{2972E3D2-B3C5-FB56-6BD1-0BD8DD76CCA3}"/>
               </a:ext>
             </a:extLst>
           </p:cNvPr>
@@ -4751,14 +5004,21 @@
             <p:ph type="title"/>
           </p:nvPr>
         </p:nvSpPr>
-        <p:spPr/>
-        <p:txBody>
-          <a:bodyPr/>
+        <p:spPr>
+          <a:xfrm>
+            <a:off x="1097280" y="286603"/>
+            <a:ext cx="10058400" cy="1450757"/>
+          </a:xfrm>
+        </p:spPr>
+        <p:txBody>
+          <a:bodyPr anchor="b">
+            <a:normAutofit/>
+          </a:bodyPr>
           <a:lstStyle/>
           <a:p>
             <a:r>
               <a:rPr lang="fr-CA" dirty="0"/>
-              <a:t>Comparaison de la performance</a:t>
+              <a:t>Bagging (n)</a:t>
             </a:r>
             <a:endParaRPr lang="en-CA" dirty="0"/>
           </a:p>
@@ -4766,33 +5026,101 @@
       </p:sp>
       <p:sp>
         <p:nvSpPr>
-          <p:cNvPr id="3" name="Text Placeholder 2">
-            <a:extLst>
-              <a:ext uri="{FF2B5EF4-FFF2-40B4-BE49-F238E27FC236}">
-                <a16:creationId xmlns:a16="http://schemas.microsoft.com/office/drawing/2014/main" id="{397E5634-2FEB-D3EA-B3E3-4BCB908672E1}"/>
-              </a:ext>
-            </a:extLst>
-          </p:cNvPr>
-          <p:cNvSpPr>
-            <a:spLocks noGrp="1"/>
-          </p:cNvSpPr>
-          <p:nvPr>
-            <p:ph type="body" idx="1"/>
-          </p:nvPr>
-        </p:nvSpPr>
-        <p:spPr/>
-        <p:txBody>
-          <a:bodyPr/>
-          <a:lstStyle/>
-          <a:p>
-            <a:endParaRPr lang="en-CA"/>
-          </a:p>
-        </p:txBody>
-      </p:sp>
+          <p:cNvPr id="10" name="Content Placeholder 2">
+            <a:extLst>
+              <a:ext uri="{FF2B5EF4-FFF2-40B4-BE49-F238E27FC236}">
+                <a16:creationId xmlns:a16="http://schemas.microsoft.com/office/drawing/2014/main" id="{5717496A-A84A-29C3-A6A2-2B42359C5744}"/>
+              </a:ext>
+            </a:extLst>
+          </p:cNvPr>
+          <p:cNvSpPr>
+            <a:spLocks noGrp="1"/>
+          </p:cNvSpPr>
+          <p:nvPr>
+            <p:ph sz="half" idx="1"/>
+          </p:nvPr>
+        </p:nvSpPr>
+        <p:spPr>
+          <a:xfrm>
+            <a:off x="1097280" y="2120900"/>
+            <a:ext cx="4639736" cy="3748193"/>
+          </a:xfrm>
+        </p:spPr>
+        <p:txBody>
+          <a:bodyPr anchor="ctr"/>
+          <a:lstStyle/>
+          <a:p>
+            <a:pPr>
+              <a:buFont typeface="Wingdings" panose="05000000000000000000" pitchFamily="2" charset="2"/>
+              <a:buChar char="q"/>
+            </a:pPr>
+            <a:r>
+              <a:rPr lang="en-US" dirty="0"/>
+              <a:t> Le RMSE minimal </a:t>
+            </a:r>
+            <a:r>
+              <a:rPr lang="en-US" dirty="0" err="1"/>
+              <a:t>est</a:t>
+            </a:r>
+            <a:r>
+              <a:rPr lang="en-US" dirty="0"/>
+              <a:t> </a:t>
+            </a:r>
+            <a:r>
+              <a:rPr lang="en-US" dirty="0" err="1"/>
+              <a:t>observé</a:t>
+            </a:r>
+            <a:r>
+              <a:rPr lang="en-US" dirty="0"/>
+              <a:t> </a:t>
+            </a:r>
+            <a:r>
+              <a:rPr lang="fr-CA" dirty="0"/>
+              <a:t>à 97 observations minimales par nœud terminal</a:t>
+            </a:r>
+            <a:endParaRPr lang="en-US" dirty="0"/>
+          </a:p>
+        </p:txBody>
+      </p:sp>
+      <p:pic>
+        <p:nvPicPr>
+          <p:cNvPr id="9" name="Content Placeholder 8" descr="Chart, line chart&#10;&#10;Description automatically generated">
+            <a:extLst>
+              <a:ext uri="{FF2B5EF4-FFF2-40B4-BE49-F238E27FC236}">
+                <a16:creationId xmlns:a16="http://schemas.microsoft.com/office/drawing/2014/main" id="{2753489D-8866-2AED-49CD-73B717A027BF}"/>
+              </a:ext>
+            </a:extLst>
+          </p:cNvPr>
+          <p:cNvPicPr>
+            <a:picLocks noGrp="1" noChangeAspect="1"/>
+          </p:cNvPicPr>
+          <p:nvPr>
+            <p:ph sz="half" idx="2"/>
+          </p:nvPr>
+        </p:nvPicPr>
+        <p:blipFill>
+          <a:blip r:embed="rId2">
+            <a:extLst>
+              <a:ext uri="{28A0092B-C50C-407E-A947-70E740481C1C}">
+                <a14:useLocalDpi xmlns:a14="http://schemas.microsoft.com/office/drawing/2010/main" val="0"/>
+              </a:ext>
+            </a:extLst>
+          </a:blip>
+          <a:stretch>
+            <a:fillRect/>
+          </a:stretch>
+        </p:blipFill>
+        <p:spPr>
+          <a:xfrm>
+            <a:off x="6516688" y="2562518"/>
+            <a:ext cx="4638675" cy="2864851"/>
+          </a:xfrm>
+        </p:spPr>
+      </p:pic>
     </p:spTree>
     <p:extLst>
       <p:ext uri="{BB962C8B-B14F-4D97-AF65-F5344CB8AC3E}">
-        <p14:creationId xmlns:p14="http://schemas.microsoft.com/office/powerpoint/2010/main" val="349769279"/>
+        <p14:creationId xmlns:p14="http://schemas.microsoft.com/office/powerpoint/2010/main" val="2127894739"/>
       </p:ext>
     </p:extLst>
   </p:cSld>
@@ -4842,7 +5170,7 @@
           <a:p>
             <a:r>
               <a:rPr lang="fr-CA" dirty="0"/>
-              <a:t>Comparaison des modèles</a:t>
+              <a:t>Forêt aléatoire</a:t>
             </a:r>
             <a:endParaRPr lang="en-CA" dirty="0"/>
           </a:p>
@@ -4850,25 +5178,308 @@
       </p:sp>
       <p:sp>
         <p:nvSpPr>
-          <p:cNvPr id="3" name="Content Placeholder 2">
-            <a:extLst>
-              <a:ext uri="{FF2B5EF4-FFF2-40B4-BE49-F238E27FC236}">
-                <a16:creationId xmlns:a16="http://schemas.microsoft.com/office/drawing/2014/main" id="{9983E910-59CB-7ECB-46A9-68D73D0A7492}"/>
-              </a:ext>
-            </a:extLst>
-          </p:cNvPr>
-          <p:cNvSpPr>
-            <a:spLocks noGrp="1"/>
-          </p:cNvSpPr>
-          <p:nvPr>
-            <p:ph idx="1"/>
-          </p:nvPr>
-        </p:nvSpPr>
-        <p:spPr/>
-        <p:txBody>
-          <a:bodyPr/>
-          <a:lstStyle/>
-          <a:p>
+          <p:cNvPr id="4" name="Content Placeholder 2">
+            <a:extLst>
+              <a:ext uri="{FF2B5EF4-FFF2-40B4-BE49-F238E27FC236}">
+                <a16:creationId xmlns:a16="http://schemas.microsoft.com/office/drawing/2014/main" id="{EB98C243-9A04-CAEF-16B1-37E1FD87468E}"/>
+              </a:ext>
+            </a:extLst>
+          </p:cNvPr>
+          <p:cNvSpPr txBox="1">
+            <a:spLocks/>
+          </p:cNvSpPr>
+          <p:nvPr/>
+        </p:nvSpPr>
+        <p:spPr>
+          <a:xfrm>
+            <a:off x="1097280" y="2141729"/>
+            <a:ext cx="10058400" cy="3760891"/>
+          </a:xfrm>
+          <a:prstGeom prst="rect">
+            <a:avLst/>
+          </a:prstGeom>
+        </p:spPr>
+        <p:txBody>
+          <a:bodyPr vert="horz" lIns="0" tIns="45720" rIns="0" bIns="45720" rtlCol="0" anchor="ctr">
+            <a:normAutofit/>
+          </a:bodyPr>
+          <a:lstStyle>
+            <a:lvl1pPr marL="91440" indent="-91440" algn="l" defTabSz="914400" rtl="0" eaLnBrk="1" latinLnBrk="0" hangingPunct="1">
+              <a:lnSpc>
+                <a:spcPct val="110000"/>
+              </a:lnSpc>
+              <a:spcBef>
+                <a:spcPts val="1200"/>
+              </a:spcBef>
+              <a:spcAft>
+                <a:spcPts val="200"/>
+              </a:spcAft>
+              <a:buClr>
+                <a:schemeClr val="accent1"/>
+              </a:buClr>
+              <a:buSzPct val="100000"/>
+              <a:buFont typeface="Calibri" panose="020F0502020204030204" pitchFamily="34" charset="0"/>
+              <a:buChar char=" "/>
+              <a:defRPr sz="1900" kern="1200">
+                <a:solidFill>
+                  <a:schemeClr val="tx1">
+                    <a:lumMod val="75000"/>
+                    <a:lumOff val="25000"/>
+                  </a:schemeClr>
+                </a:solidFill>
+                <a:latin typeface="+mn-lt"/>
+                <a:ea typeface="+mn-ea"/>
+                <a:cs typeface="+mn-cs"/>
+              </a:defRPr>
+            </a:lvl1pPr>
+            <a:lvl2pPr marL="384048" indent="-182880" algn="l" defTabSz="914400" rtl="0" eaLnBrk="1" latinLnBrk="0" hangingPunct="1">
+              <a:lnSpc>
+                <a:spcPct val="100000"/>
+              </a:lnSpc>
+              <a:spcBef>
+                <a:spcPts val="200"/>
+              </a:spcBef>
+              <a:spcAft>
+                <a:spcPts val="400"/>
+              </a:spcAft>
+              <a:buClrTx/>
+              <a:buFont typeface="Calibri" pitchFamily="34" charset="0"/>
+              <a:buChar char="◦"/>
+              <a:defRPr sz="1700" kern="1200">
+                <a:solidFill>
+                  <a:schemeClr val="tx1">
+                    <a:lumMod val="75000"/>
+                    <a:lumOff val="25000"/>
+                  </a:schemeClr>
+                </a:solidFill>
+                <a:latin typeface="+mn-lt"/>
+                <a:ea typeface="+mn-ea"/>
+                <a:cs typeface="+mn-cs"/>
+              </a:defRPr>
+            </a:lvl2pPr>
+            <a:lvl3pPr marL="566928" indent="-182880" algn="l" defTabSz="914400" rtl="0" eaLnBrk="1" latinLnBrk="0" hangingPunct="1">
+              <a:lnSpc>
+                <a:spcPct val="100000"/>
+              </a:lnSpc>
+              <a:spcBef>
+                <a:spcPts val="200"/>
+              </a:spcBef>
+              <a:spcAft>
+                <a:spcPts val="400"/>
+              </a:spcAft>
+              <a:buClrTx/>
+              <a:buFont typeface="Calibri" pitchFamily="34" charset="0"/>
+              <a:buChar char="◦"/>
+              <a:defRPr sz="1300" kern="1200">
+                <a:solidFill>
+                  <a:schemeClr val="tx1">
+                    <a:lumMod val="75000"/>
+                    <a:lumOff val="25000"/>
+                  </a:schemeClr>
+                </a:solidFill>
+                <a:latin typeface="+mn-lt"/>
+                <a:ea typeface="+mn-ea"/>
+                <a:cs typeface="+mn-cs"/>
+              </a:defRPr>
+            </a:lvl3pPr>
+            <a:lvl4pPr marL="749808" indent="-182880" algn="l" defTabSz="914400" rtl="0" eaLnBrk="1" latinLnBrk="0" hangingPunct="1">
+              <a:lnSpc>
+                <a:spcPct val="100000"/>
+              </a:lnSpc>
+              <a:spcBef>
+                <a:spcPts val="200"/>
+              </a:spcBef>
+              <a:spcAft>
+                <a:spcPts val="400"/>
+              </a:spcAft>
+              <a:buClrTx/>
+              <a:buFont typeface="Calibri" pitchFamily="34" charset="0"/>
+              <a:buChar char="◦"/>
+              <a:defRPr sz="1300" kern="1200">
+                <a:solidFill>
+                  <a:schemeClr val="tx1">
+                    <a:lumMod val="75000"/>
+                    <a:lumOff val="25000"/>
+                  </a:schemeClr>
+                </a:solidFill>
+                <a:latin typeface="+mn-lt"/>
+                <a:ea typeface="+mn-ea"/>
+                <a:cs typeface="+mn-cs"/>
+              </a:defRPr>
+            </a:lvl4pPr>
+            <a:lvl5pPr marL="932688" indent="-182880" algn="l" defTabSz="914400" rtl="0" eaLnBrk="1" latinLnBrk="0" hangingPunct="1">
+              <a:lnSpc>
+                <a:spcPct val="100000"/>
+              </a:lnSpc>
+              <a:spcBef>
+                <a:spcPts val="200"/>
+              </a:spcBef>
+              <a:spcAft>
+                <a:spcPts val="400"/>
+              </a:spcAft>
+              <a:buClrTx/>
+              <a:buFont typeface="Calibri" pitchFamily="34" charset="0"/>
+              <a:buChar char="◦"/>
+              <a:defRPr sz="1300" kern="1200">
+                <a:solidFill>
+                  <a:schemeClr val="tx1">
+                    <a:lumMod val="75000"/>
+                    <a:lumOff val="25000"/>
+                  </a:schemeClr>
+                </a:solidFill>
+                <a:latin typeface="+mn-lt"/>
+                <a:ea typeface="+mn-ea"/>
+                <a:cs typeface="+mn-cs"/>
+              </a:defRPr>
+            </a:lvl5pPr>
+            <a:lvl6pPr marL="1100000" indent="-228600" algn="l" defTabSz="914400" rtl="0" eaLnBrk="1" latinLnBrk="0" hangingPunct="1">
+              <a:lnSpc>
+                <a:spcPct val="90000"/>
+              </a:lnSpc>
+              <a:spcBef>
+                <a:spcPts val="200"/>
+              </a:spcBef>
+              <a:spcAft>
+                <a:spcPts val="400"/>
+              </a:spcAft>
+              <a:buClr>
+                <a:schemeClr val="accent1"/>
+              </a:buClr>
+              <a:buFont typeface="Calibri" pitchFamily="34" charset="0"/>
+              <a:buChar char="◦"/>
+              <a:defRPr sz="1400" kern="1200">
+                <a:solidFill>
+                  <a:schemeClr val="tx1">
+                    <a:lumMod val="75000"/>
+                    <a:lumOff val="25000"/>
+                  </a:schemeClr>
+                </a:solidFill>
+                <a:latin typeface="+mn-lt"/>
+                <a:ea typeface="+mn-ea"/>
+                <a:cs typeface="+mn-cs"/>
+              </a:defRPr>
+            </a:lvl6pPr>
+            <a:lvl7pPr marL="1300000" indent="-228600" algn="l" defTabSz="914400" rtl="0" eaLnBrk="1" latinLnBrk="0" hangingPunct="1">
+              <a:lnSpc>
+                <a:spcPct val="90000"/>
+              </a:lnSpc>
+              <a:spcBef>
+                <a:spcPts val="200"/>
+              </a:spcBef>
+              <a:spcAft>
+                <a:spcPts val="400"/>
+              </a:spcAft>
+              <a:buClr>
+                <a:schemeClr val="accent1"/>
+              </a:buClr>
+              <a:buFont typeface="Calibri" pitchFamily="34" charset="0"/>
+              <a:buChar char="◦"/>
+              <a:defRPr sz="1400" kern="1200">
+                <a:solidFill>
+                  <a:schemeClr val="tx1">
+                    <a:lumMod val="75000"/>
+                    <a:lumOff val="25000"/>
+                  </a:schemeClr>
+                </a:solidFill>
+                <a:latin typeface="+mn-lt"/>
+                <a:ea typeface="+mn-ea"/>
+                <a:cs typeface="+mn-cs"/>
+              </a:defRPr>
+            </a:lvl7pPr>
+            <a:lvl8pPr marL="1500000" indent="-228600" algn="l" defTabSz="914400" rtl="0" eaLnBrk="1" latinLnBrk="0" hangingPunct="1">
+              <a:lnSpc>
+                <a:spcPct val="90000"/>
+              </a:lnSpc>
+              <a:spcBef>
+                <a:spcPts val="200"/>
+              </a:spcBef>
+              <a:spcAft>
+                <a:spcPts val="400"/>
+              </a:spcAft>
+              <a:buClr>
+                <a:schemeClr val="accent1"/>
+              </a:buClr>
+              <a:buFont typeface="Calibri" pitchFamily="34" charset="0"/>
+              <a:buChar char="◦"/>
+              <a:defRPr sz="1400" kern="1200">
+                <a:solidFill>
+                  <a:schemeClr val="tx1">
+                    <a:lumMod val="75000"/>
+                    <a:lumOff val="25000"/>
+                  </a:schemeClr>
+                </a:solidFill>
+                <a:latin typeface="+mn-lt"/>
+                <a:ea typeface="+mn-ea"/>
+                <a:cs typeface="+mn-cs"/>
+              </a:defRPr>
+            </a:lvl8pPr>
+            <a:lvl9pPr marL="1700000" indent="-228600" algn="l" defTabSz="914400" rtl="0" eaLnBrk="1" latinLnBrk="0" hangingPunct="1">
+              <a:lnSpc>
+                <a:spcPct val="90000"/>
+              </a:lnSpc>
+              <a:spcBef>
+                <a:spcPts val="200"/>
+              </a:spcBef>
+              <a:spcAft>
+                <a:spcPts val="400"/>
+              </a:spcAft>
+              <a:buClr>
+                <a:schemeClr val="accent1"/>
+              </a:buClr>
+              <a:buFont typeface="Calibri" pitchFamily="34" charset="0"/>
+              <a:buChar char="◦"/>
+              <a:defRPr sz="1400" kern="1200">
+                <a:solidFill>
+                  <a:schemeClr val="tx1">
+                    <a:lumMod val="75000"/>
+                    <a:lumOff val="25000"/>
+                  </a:schemeClr>
+                </a:solidFill>
+                <a:latin typeface="+mn-lt"/>
+                <a:ea typeface="+mn-ea"/>
+                <a:cs typeface="+mn-cs"/>
+              </a:defRPr>
+            </a:lvl9pPr>
+          </a:lstStyle>
+          <a:p>
+            <a:pPr marL="0" indent="0">
+              <a:buFont typeface="Calibri" panose="020F0502020204030204" pitchFamily="34" charset="0"/>
+              <a:buNone/>
+            </a:pPr>
+            <a:r>
+              <a:rPr lang="fr-CA" dirty="0"/>
+              <a:t>Il y a trois hyperparamètres à optimiser dans le cas de la forêt aléatoire: </a:t>
+            </a:r>
+          </a:p>
+          <a:p>
+            <a:pPr>
+              <a:buFont typeface="Wingdings" panose="05000000000000000000" pitchFamily="2" charset="2"/>
+              <a:buChar char="q"/>
+            </a:pPr>
+            <a:r>
+              <a:rPr lang="fr-CA" dirty="0"/>
+              <a:t> B : Nombre d’arbres</a:t>
+            </a:r>
+          </a:p>
+          <a:p>
+            <a:pPr>
+              <a:buFont typeface="Wingdings" panose="05000000000000000000" pitchFamily="2" charset="2"/>
+              <a:buChar char="q"/>
+            </a:pPr>
+            <a:r>
+              <a:rPr lang="fr-CA" dirty="0"/>
+              <a:t> m : Nombre de variables disponibles pour la séparation de chaque arbre</a:t>
+            </a:r>
+          </a:p>
+          <a:p>
+            <a:pPr>
+              <a:buFont typeface="Wingdings" panose="05000000000000000000" pitchFamily="2" charset="2"/>
+              <a:buChar char="q"/>
+            </a:pPr>
+            <a:r>
+              <a:rPr lang="fr-CA" dirty="0"/>
+              <a:t> n : Nombre d’observations minimal dans un nœud terminal</a:t>
+            </a:r>
             <a:endParaRPr lang="en-CA" dirty="0"/>
           </a:p>
         </p:txBody>
@@ -4876,7 +5487,7 @@
     </p:spTree>
     <p:extLst>
       <p:ext uri="{BB962C8B-B14F-4D97-AF65-F5344CB8AC3E}">
-        <p14:creationId xmlns:p14="http://schemas.microsoft.com/office/powerpoint/2010/main" val="3655165667"/>
+        <p14:creationId xmlns:p14="http://schemas.microsoft.com/office/powerpoint/2010/main" val="1102128177"/>
       </p:ext>
     </p:extLst>
   </p:cSld>
@@ -4926,7 +5537,11 @@
           <a:p>
             <a:r>
               <a:rPr lang="fr-CA" dirty="0"/>
-              <a:t>Analyse des résultats pour le meilleur modèle: XXX</a:t>
+              <a:t>Gradient </a:t>
+            </a:r>
+            <a:r>
+              <a:rPr lang="fr-CA" dirty="0" err="1"/>
+              <a:t>Boosting</a:t>
             </a:r>
             <a:endParaRPr lang="en-CA" dirty="0"/>
           </a:p>
@@ -4960,7 +5575,7 @@
     </p:spTree>
     <p:extLst>
       <p:ext uri="{BB962C8B-B14F-4D97-AF65-F5344CB8AC3E}">
-        <p14:creationId xmlns:p14="http://schemas.microsoft.com/office/powerpoint/2010/main" val="3969872878"/>
+        <p14:creationId xmlns:p14="http://schemas.microsoft.com/office/powerpoint/2010/main" val="1655170980"/>
       </p:ext>
     </p:extLst>
   </p:cSld>
@@ -4992,7 +5607,7 @@
           <p:cNvPr id="2" name="Title 1">
             <a:extLst>
               <a:ext uri="{FF2B5EF4-FFF2-40B4-BE49-F238E27FC236}">
-                <a16:creationId xmlns:a16="http://schemas.microsoft.com/office/drawing/2014/main" id="{2972E3D2-B3C5-FB56-6BD1-0BD8DD76CCA3}"/>
+                <a16:creationId xmlns:a16="http://schemas.microsoft.com/office/drawing/2014/main" id="{94951D72-9FC3-B808-3CC4-B291E4C2CC30}"/>
               </a:ext>
             </a:extLst>
           </p:cNvPr>
@@ -5010,7 +5625,7 @@
           <a:p>
             <a:r>
               <a:rPr lang="fr-CA" dirty="0"/>
-              <a:t>Interprétation des résultats</a:t>
+              <a:t>Comparaison de la performance</a:t>
             </a:r>
             <a:endParaRPr lang="en-CA" dirty="0"/>
           </a:p>
@@ -5018,18 +5633,18 @@
       </p:sp>
       <p:sp>
         <p:nvSpPr>
-          <p:cNvPr id="3" name="Content Placeholder 2">
-            <a:extLst>
-              <a:ext uri="{FF2B5EF4-FFF2-40B4-BE49-F238E27FC236}">
-                <a16:creationId xmlns:a16="http://schemas.microsoft.com/office/drawing/2014/main" id="{9983E910-59CB-7ECB-46A9-68D73D0A7492}"/>
-              </a:ext>
-            </a:extLst>
-          </p:cNvPr>
-          <p:cNvSpPr>
-            <a:spLocks noGrp="1"/>
-          </p:cNvSpPr>
-          <p:nvPr>
-            <p:ph idx="1"/>
+          <p:cNvPr id="3" name="Text Placeholder 2">
+            <a:extLst>
+              <a:ext uri="{FF2B5EF4-FFF2-40B4-BE49-F238E27FC236}">
+                <a16:creationId xmlns:a16="http://schemas.microsoft.com/office/drawing/2014/main" id="{397E5634-2FEB-D3EA-B3E3-4BCB908672E1}"/>
+              </a:ext>
+            </a:extLst>
+          </p:cNvPr>
+          <p:cNvSpPr>
+            <a:spLocks noGrp="1"/>
+          </p:cNvSpPr>
+          <p:nvPr>
+            <p:ph type="body" idx="1"/>
           </p:nvPr>
         </p:nvSpPr>
         <p:spPr/>
@@ -5037,14 +5652,14 @@
           <a:bodyPr/>
           <a:lstStyle/>
           <a:p>
-            <a:endParaRPr lang="en-CA" dirty="0"/>
+            <a:endParaRPr lang="en-CA"/>
           </a:p>
         </p:txBody>
       </p:sp>
     </p:spTree>
     <p:extLst>
       <p:ext uri="{BB962C8B-B14F-4D97-AF65-F5344CB8AC3E}">
-        <p14:creationId xmlns:p14="http://schemas.microsoft.com/office/powerpoint/2010/main" val="2094673800"/>
+        <p14:creationId xmlns:p14="http://schemas.microsoft.com/office/powerpoint/2010/main" val="349769279"/>
       </p:ext>
     </p:extLst>
   </p:cSld>
@@ -5076,7 +5691,7 @@
           <p:cNvPr id="2" name="Title 1">
             <a:extLst>
               <a:ext uri="{FF2B5EF4-FFF2-40B4-BE49-F238E27FC236}">
-                <a16:creationId xmlns:a16="http://schemas.microsoft.com/office/drawing/2014/main" id="{94951D72-9FC3-B808-3CC4-B291E4C2CC30}"/>
+                <a16:creationId xmlns:a16="http://schemas.microsoft.com/office/drawing/2014/main" id="{2972E3D2-B3C5-FB56-6BD1-0BD8DD76CCA3}"/>
               </a:ext>
             </a:extLst>
           </p:cNvPr>
@@ -5094,7 +5709,7 @@
           <a:p>
             <a:r>
               <a:rPr lang="fr-CA" dirty="0"/>
-              <a:t>Conclusion</a:t>
+              <a:t>Comparaison des modèles</a:t>
             </a:r>
             <a:endParaRPr lang="en-CA" dirty="0"/>
           </a:p>
@@ -5102,18 +5717,18 @@
       </p:sp>
       <p:sp>
         <p:nvSpPr>
-          <p:cNvPr id="3" name="Text Placeholder 2">
-            <a:extLst>
-              <a:ext uri="{FF2B5EF4-FFF2-40B4-BE49-F238E27FC236}">
-                <a16:creationId xmlns:a16="http://schemas.microsoft.com/office/drawing/2014/main" id="{397E5634-2FEB-D3EA-B3E3-4BCB908672E1}"/>
-              </a:ext>
-            </a:extLst>
-          </p:cNvPr>
-          <p:cNvSpPr>
-            <a:spLocks noGrp="1"/>
-          </p:cNvSpPr>
-          <p:nvPr>
-            <p:ph type="body" idx="1"/>
+          <p:cNvPr id="3" name="Content Placeholder 2">
+            <a:extLst>
+              <a:ext uri="{FF2B5EF4-FFF2-40B4-BE49-F238E27FC236}">
+                <a16:creationId xmlns:a16="http://schemas.microsoft.com/office/drawing/2014/main" id="{9983E910-59CB-7ECB-46A9-68D73D0A7492}"/>
+              </a:ext>
+            </a:extLst>
+          </p:cNvPr>
+          <p:cNvSpPr>
+            <a:spLocks noGrp="1"/>
+          </p:cNvSpPr>
+          <p:nvPr>
+            <p:ph idx="1"/>
           </p:nvPr>
         </p:nvSpPr>
         <p:spPr/>
@@ -5121,14 +5736,14 @@
           <a:bodyPr/>
           <a:lstStyle/>
           <a:p>
-            <a:endParaRPr lang="en-CA"/>
+            <a:endParaRPr lang="en-CA" dirty="0"/>
           </a:p>
         </p:txBody>
       </p:sp>
     </p:spTree>
     <p:extLst>
       <p:ext uri="{BB962C8B-B14F-4D97-AF65-F5344CB8AC3E}">
-        <p14:creationId xmlns:p14="http://schemas.microsoft.com/office/powerpoint/2010/main" val="1717889379"/>
+        <p14:creationId xmlns:p14="http://schemas.microsoft.com/office/powerpoint/2010/main" val="3655165667"/>
       </p:ext>
     </p:extLst>
   </p:cSld>
@@ -5180,6 +5795,163 @@
               <a:rPr lang="fr-CA" dirty="0"/>
               <a:t>Plan de la présentation</a:t>
             </a:r>
+            <a:endParaRPr lang="en-CA" dirty="0"/>
+          </a:p>
+        </p:txBody>
+      </p:sp>
+      <p:sp>
+        <p:nvSpPr>
+          <p:cNvPr id="3" name="TextBox 2">
+            <a:extLst>
+              <a:ext uri="{FF2B5EF4-FFF2-40B4-BE49-F238E27FC236}">
+                <a16:creationId xmlns:a16="http://schemas.microsoft.com/office/drawing/2014/main" id="{8F7BA66B-DE45-D6C2-4FD5-DDFE4D52F15C}"/>
+              </a:ext>
+            </a:extLst>
+          </p:cNvPr>
+          <p:cNvSpPr txBox="1"/>
+          <p:nvPr/>
+        </p:nvSpPr>
+        <p:spPr>
+          <a:xfrm>
+            <a:off x="1097280" y="2002536"/>
+            <a:ext cx="9939528" cy="4832092"/>
+          </a:xfrm>
+          <a:prstGeom prst="rect">
+            <a:avLst/>
+          </a:prstGeom>
+          <a:noFill/>
+        </p:spPr>
+        <p:txBody>
+          <a:bodyPr wrap="square" rtlCol="0">
+            <a:spAutoFit/>
+          </a:bodyPr>
+          <a:lstStyle/>
+          <a:p>
+            <a:pPr marL="285750" indent="-285750">
+              <a:buFont typeface="Wingdings" panose="05000000000000000000" pitchFamily="2" charset="2"/>
+              <a:buChar char="q"/>
+            </a:pPr>
+            <a:endParaRPr lang="fr-CA" sz="2000" dirty="0"/>
+          </a:p>
+          <a:p>
+            <a:pPr marL="285750" indent="-285750">
+              <a:buFont typeface="Wingdings" panose="05000000000000000000" pitchFamily="2" charset="2"/>
+              <a:buChar char="q"/>
+            </a:pPr>
+            <a:r>
+              <a:rPr lang="fr-CA" sz="2400" dirty="0"/>
+              <a:t>P</a:t>
+            </a:r>
+            <a:r>
+              <a:rPr lang="en-CA" sz="2400" dirty="0" err="1"/>
+              <a:t>roblématique</a:t>
+            </a:r>
+            <a:endParaRPr lang="en-CA" sz="2400" dirty="0"/>
+          </a:p>
+          <a:p>
+            <a:endParaRPr lang="en-CA" sz="2400" dirty="0"/>
+          </a:p>
+          <a:p>
+            <a:pPr marL="285750" indent="-285750">
+              <a:buFont typeface="Wingdings" panose="05000000000000000000" pitchFamily="2" charset="2"/>
+              <a:buChar char="q"/>
+            </a:pPr>
+            <a:r>
+              <a:rPr lang="en-CA" sz="2400" dirty="0"/>
+              <a:t>Jeu de </a:t>
+            </a:r>
+            <a:r>
+              <a:rPr lang="en-CA" sz="2400" dirty="0" err="1"/>
+              <a:t>données</a:t>
+            </a:r>
+            <a:endParaRPr lang="en-CA" sz="2400" dirty="0"/>
+          </a:p>
+          <a:p>
+            <a:endParaRPr lang="en-CA" sz="2400" dirty="0"/>
+          </a:p>
+          <a:p>
+            <a:pPr marL="285750" indent="-285750">
+              <a:buFont typeface="Wingdings" panose="05000000000000000000" pitchFamily="2" charset="2"/>
+              <a:buChar char="q"/>
+            </a:pPr>
+            <a:r>
+              <a:rPr lang="en-CA" sz="2400" dirty="0" err="1"/>
+              <a:t>Modèles</a:t>
+            </a:r>
+            <a:r>
+              <a:rPr lang="en-CA" sz="2400" dirty="0"/>
+              <a:t> </a:t>
+            </a:r>
+            <a:r>
+              <a:rPr lang="en-CA" sz="2400" dirty="0" err="1"/>
+              <a:t>Prédictifs</a:t>
+            </a:r>
+            <a:endParaRPr lang="en-CA" sz="2400" dirty="0"/>
+          </a:p>
+          <a:p>
+            <a:pPr marL="285750" indent="-285750">
+              <a:buFont typeface="Wingdings" panose="05000000000000000000" pitchFamily="2" charset="2"/>
+              <a:buChar char="q"/>
+            </a:pPr>
+            <a:endParaRPr lang="en-CA" sz="2400" dirty="0"/>
+          </a:p>
+          <a:p>
+            <a:pPr marL="285750" indent="-285750">
+              <a:buFont typeface="Wingdings" panose="05000000000000000000" pitchFamily="2" charset="2"/>
+              <a:buChar char="q"/>
+            </a:pPr>
+            <a:r>
+              <a:rPr lang="en-CA" sz="2400" dirty="0" err="1"/>
+              <a:t>Comparaison</a:t>
+            </a:r>
+            <a:r>
+              <a:rPr lang="en-CA" sz="2400" dirty="0"/>
+              <a:t> de la performance</a:t>
+            </a:r>
+          </a:p>
+          <a:p>
+            <a:pPr marL="285750" indent="-285750">
+              <a:buFont typeface="Wingdings" panose="05000000000000000000" pitchFamily="2" charset="2"/>
+              <a:buChar char="q"/>
+            </a:pPr>
+            <a:endParaRPr lang="en-CA" sz="2400" dirty="0"/>
+          </a:p>
+          <a:p>
+            <a:pPr marL="285750" indent="-285750">
+              <a:buFont typeface="Wingdings" panose="05000000000000000000" pitchFamily="2" charset="2"/>
+              <a:buChar char="q"/>
+            </a:pPr>
+            <a:r>
+              <a:rPr lang="en-CA" sz="2400" dirty="0"/>
+              <a:t>Conclusion</a:t>
+            </a:r>
+          </a:p>
+          <a:p>
+            <a:pPr marL="742950" lvl="1" indent="-285750">
+              <a:buFont typeface="Wingdings" panose="05000000000000000000" pitchFamily="2" charset="2"/>
+              <a:buChar char="q"/>
+            </a:pPr>
+            <a:endParaRPr lang="en-CA" dirty="0"/>
+          </a:p>
+          <a:p>
+            <a:pPr marL="285750" indent="-285750">
+              <a:buFont typeface="Wingdings" panose="05000000000000000000" pitchFamily="2" charset="2"/>
+              <a:buChar char="q"/>
+            </a:pPr>
+            <a:endParaRPr lang="en-CA" dirty="0"/>
+          </a:p>
+          <a:p>
+            <a:pPr marL="285750" indent="-285750">
+              <a:buFont typeface="Wingdings" panose="05000000000000000000" pitchFamily="2" charset="2"/>
+              <a:buChar char="q"/>
+            </a:pPr>
+            <a:endParaRPr lang="en-CA" dirty="0"/>
+          </a:p>
+          <a:p>
+            <a:pPr marL="285750" indent="-285750">
+              <a:buFont typeface="Wingdings" panose="05000000000000000000" pitchFamily="2" charset="2"/>
+              <a:buChar char="q"/>
+            </a:pPr>
             <a:endParaRPr lang="en-CA" dirty="0"/>
           </a:p>
         </p:txBody>
@@ -5237,6 +6009,258 @@
           <a:p>
             <a:r>
               <a:rPr lang="fr-CA" dirty="0"/>
+              <a:t>Analyse des résultats pour le meilleur modèle: XXX</a:t>
+            </a:r>
+            <a:endParaRPr lang="en-CA" dirty="0"/>
+          </a:p>
+        </p:txBody>
+      </p:sp>
+      <p:sp>
+        <p:nvSpPr>
+          <p:cNvPr id="3" name="Content Placeholder 2">
+            <a:extLst>
+              <a:ext uri="{FF2B5EF4-FFF2-40B4-BE49-F238E27FC236}">
+                <a16:creationId xmlns:a16="http://schemas.microsoft.com/office/drawing/2014/main" id="{9983E910-59CB-7ECB-46A9-68D73D0A7492}"/>
+              </a:ext>
+            </a:extLst>
+          </p:cNvPr>
+          <p:cNvSpPr>
+            <a:spLocks noGrp="1"/>
+          </p:cNvSpPr>
+          <p:nvPr>
+            <p:ph idx="1"/>
+          </p:nvPr>
+        </p:nvSpPr>
+        <p:spPr/>
+        <p:txBody>
+          <a:bodyPr/>
+          <a:lstStyle/>
+          <a:p>
+            <a:endParaRPr lang="en-CA" dirty="0"/>
+          </a:p>
+        </p:txBody>
+      </p:sp>
+    </p:spTree>
+    <p:extLst>
+      <p:ext uri="{BB962C8B-B14F-4D97-AF65-F5344CB8AC3E}">
+        <p14:creationId xmlns:p14="http://schemas.microsoft.com/office/powerpoint/2010/main" val="3969872878"/>
+      </p:ext>
+    </p:extLst>
+  </p:cSld>
+  <p:clrMapOvr>
+    <a:masterClrMapping/>
+  </p:clrMapOvr>
+</p:sld>
+</file>
+
+<file path=ppt/slides/slide21.xml><?xml version="1.0" encoding="utf-8"?>
+<p:sld xmlns:a="http://schemas.openxmlformats.org/drawingml/2006/main" xmlns:r="http://schemas.openxmlformats.org/officeDocument/2006/relationships" xmlns:p="http://schemas.openxmlformats.org/presentationml/2006/main">
+  <p:cSld>
+    <p:spTree>
+      <p:nvGrpSpPr>
+        <p:cNvPr id="1" name=""/>
+        <p:cNvGrpSpPr/>
+        <p:nvPr/>
+      </p:nvGrpSpPr>
+      <p:grpSpPr>
+        <a:xfrm>
+          <a:off x="0" y="0"/>
+          <a:ext cx="0" cy="0"/>
+          <a:chOff x="0" y="0"/>
+          <a:chExt cx="0" cy="0"/>
+        </a:xfrm>
+      </p:grpSpPr>
+      <p:sp>
+        <p:nvSpPr>
+          <p:cNvPr id="2" name="Title 1">
+            <a:extLst>
+              <a:ext uri="{FF2B5EF4-FFF2-40B4-BE49-F238E27FC236}">
+                <a16:creationId xmlns:a16="http://schemas.microsoft.com/office/drawing/2014/main" id="{2972E3D2-B3C5-FB56-6BD1-0BD8DD76CCA3}"/>
+              </a:ext>
+            </a:extLst>
+          </p:cNvPr>
+          <p:cNvSpPr>
+            <a:spLocks noGrp="1"/>
+          </p:cNvSpPr>
+          <p:nvPr>
+            <p:ph type="title"/>
+          </p:nvPr>
+        </p:nvSpPr>
+        <p:spPr/>
+        <p:txBody>
+          <a:bodyPr/>
+          <a:lstStyle/>
+          <a:p>
+            <a:r>
+              <a:rPr lang="fr-CA" dirty="0"/>
+              <a:t>Interprétation des résultats</a:t>
+            </a:r>
+            <a:endParaRPr lang="en-CA" dirty="0"/>
+          </a:p>
+        </p:txBody>
+      </p:sp>
+      <p:sp>
+        <p:nvSpPr>
+          <p:cNvPr id="3" name="Content Placeholder 2">
+            <a:extLst>
+              <a:ext uri="{FF2B5EF4-FFF2-40B4-BE49-F238E27FC236}">
+                <a16:creationId xmlns:a16="http://schemas.microsoft.com/office/drawing/2014/main" id="{9983E910-59CB-7ECB-46A9-68D73D0A7492}"/>
+              </a:ext>
+            </a:extLst>
+          </p:cNvPr>
+          <p:cNvSpPr>
+            <a:spLocks noGrp="1"/>
+          </p:cNvSpPr>
+          <p:nvPr>
+            <p:ph idx="1"/>
+          </p:nvPr>
+        </p:nvSpPr>
+        <p:spPr/>
+        <p:txBody>
+          <a:bodyPr/>
+          <a:lstStyle/>
+          <a:p>
+            <a:endParaRPr lang="en-CA" dirty="0"/>
+          </a:p>
+        </p:txBody>
+      </p:sp>
+    </p:spTree>
+    <p:extLst>
+      <p:ext uri="{BB962C8B-B14F-4D97-AF65-F5344CB8AC3E}">
+        <p14:creationId xmlns:p14="http://schemas.microsoft.com/office/powerpoint/2010/main" val="2094673800"/>
+      </p:ext>
+    </p:extLst>
+  </p:cSld>
+  <p:clrMapOvr>
+    <a:masterClrMapping/>
+  </p:clrMapOvr>
+</p:sld>
+</file>
+
+<file path=ppt/slides/slide22.xml><?xml version="1.0" encoding="utf-8"?>
+<p:sld xmlns:a="http://schemas.openxmlformats.org/drawingml/2006/main" xmlns:r="http://schemas.openxmlformats.org/officeDocument/2006/relationships" xmlns:p="http://schemas.openxmlformats.org/presentationml/2006/main">
+  <p:cSld>
+    <p:spTree>
+      <p:nvGrpSpPr>
+        <p:cNvPr id="1" name=""/>
+        <p:cNvGrpSpPr/>
+        <p:nvPr/>
+      </p:nvGrpSpPr>
+      <p:grpSpPr>
+        <a:xfrm>
+          <a:off x="0" y="0"/>
+          <a:ext cx="0" cy="0"/>
+          <a:chOff x="0" y="0"/>
+          <a:chExt cx="0" cy="0"/>
+        </a:xfrm>
+      </p:grpSpPr>
+      <p:sp>
+        <p:nvSpPr>
+          <p:cNvPr id="2" name="Title 1">
+            <a:extLst>
+              <a:ext uri="{FF2B5EF4-FFF2-40B4-BE49-F238E27FC236}">
+                <a16:creationId xmlns:a16="http://schemas.microsoft.com/office/drawing/2014/main" id="{94951D72-9FC3-B808-3CC4-B291E4C2CC30}"/>
+              </a:ext>
+            </a:extLst>
+          </p:cNvPr>
+          <p:cNvSpPr>
+            <a:spLocks noGrp="1"/>
+          </p:cNvSpPr>
+          <p:nvPr>
+            <p:ph type="title"/>
+          </p:nvPr>
+        </p:nvSpPr>
+        <p:spPr/>
+        <p:txBody>
+          <a:bodyPr/>
+          <a:lstStyle/>
+          <a:p>
+            <a:r>
+              <a:rPr lang="fr-CA" dirty="0"/>
+              <a:t>Conclusion</a:t>
+            </a:r>
+            <a:endParaRPr lang="en-CA" dirty="0"/>
+          </a:p>
+        </p:txBody>
+      </p:sp>
+      <p:sp>
+        <p:nvSpPr>
+          <p:cNvPr id="3" name="Text Placeholder 2">
+            <a:extLst>
+              <a:ext uri="{FF2B5EF4-FFF2-40B4-BE49-F238E27FC236}">
+                <a16:creationId xmlns:a16="http://schemas.microsoft.com/office/drawing/2014/main" id="{397E5634-2FEB-D3EA-B3E3-4BCB908672E1}"/>
+              </a:ext>
+            </a:extLst>
+          </p:cNvPr>
+          <p:cNvSpPr>
+            <a:spLocks noGrp="1"/>
+          </p:cNvSpPr>
+          <p:nvPr>
+            <p:ph type="body" idx="1"/>
+          </p:nvPr>
+        </p:nvSpPr>
+        <p:spPr/>
+        <p:txBody>
+          <a:bodyPr/>
+          <a:lstStyle/>
+          <a:p>
+            <a:endParaRPr lang="en-CA"/>
+          </a:p>
+        </p:txBody>
+      </p:sp>
+    </p:spTree>
+    <p:extLst>
+      <p:ext uri="{BB962C8B-B14F-4D97-AF65-F5344CB8AC3E}">
+        <p14:creationId xmlns:p14="http://schemas.microsoft.com/office/powerpoint/2010/main" val="1717889379"/>
+      </p:ext>
+    </p:extLst>
+  </p:cSld>
+  <p:clrMapOvr>
+    <a:masterClrMapping/>
+  </p:clrMapOvr>
+</p:sld>
+</file>
+
+<file path=ppt/slides/slide23.xml><?xml version="1.0" encoding="utf-8"?>
+<p:sld xmlns:a="http://schemas.openxmlformats.org/drawingml/2006/main" xmlns:r="http://schemas.openxmlformats.org/officeDocument/2006/relationships" xmlns:p="http://schemas.openxmlformats.org/presentationml/2006/main">
+  <p:cSld>
+    <p:spTree>
+      <p:nvGrpSpPr>
+        <p:cNvPr id="1" name=""/>
+        <p:cNvGrpSpPr/>
+        <p:nvPr/>
+      </p:nvGrpSpPr>
+      <p:grpSpPr>
+        <a:xfrm>
+          <a:off x="0" y="0"/>
+          <a:ext cx="0" cy="0"/>
+          <a:chOff x="0" y="0"/>
+          <a:chExt cx="0" cy="0"/>
+        </a:xfrm>
+      </p:grpSpPr>
+      <p:sp>
+        <p:nvSpPr>
+          <p:cNvPr id="2" name="Title 1">
+            <a:extLst>
+              <a:ext uri="{FF2B5EF4-FFF2-40B4-BE49-F238E27FC236}">
+                <a16:creationId xmlns:a16="http://schemas.microsoft.com/office/drawing/2014/main" id="{2972E3D2-B3C5-FB56-6BD1-0BD8DD76CCA3}"/>
+              </a:ext>
+            </a:extLst>
+          </p:cNvPr>
+          <p:cNvSpPr>
+            <a:spLocks noGrp="1"/>
+          </p:cNvSpPr>
+          <p:nvPr>
+            <p:ph type="title"/>
+          </p:nvPr>
+        </p:nvSpPr>
+        <p:spPr/>
+        <p:txBody>
+          <a:bodyPr/>
+          <a:lstStyle/>
+          <a:p>
+            <a:r>
+              <a:rPr lang="fr-CA" dirty="0"/>
               <a:t>Bibliographie</a:t>
             </a:r>
             <a:endParaRPr lang="en-CA" dirty="0"/>
@@ -5298,6 +6322,51 @@
           <a:chExt cx="0" cy="0"/>
         </a:xfrm>
       </p:grpSpPr>
+      <p:pic>
+        <p:nvPicPr>
+          <p:cNvPr id="1026" name="Picture 2" descr="Cars and homes are engulfed by floodwaters in Pajaro, California, on Saturday.">
+            <a:extLst>
+              <a:ext uri="{FF2B5EF4-FFF2-40B4-BE49-F238E27FC236}">
+                <a16:creationId xmlns:a16="http://schemas.microsoft.com/office/drawing/2014/main" id="{25FCBAE7-3651-225A-C8E2-49EC502F6FE7}"/>
+              </a:ext>
+            </a:extLst>
+          </p:cNvPr>
+          <p:cNvPicPr>
+            <a:picLocks noChangeAspect="1" noChangeArrowheads="1"/>
+          </p:cNvPicPr>
+          <p:nvPr/>
+        </p:nvPicPr>
+        <p:blipFill rotWithShape="1">
+          <a:blip r:embed="rId2">
+            <a:extLst>
+              <a:ext uri="{28A0092B-C50C-407E-A947-70E740481C1C}">
+                <a14:useLocalDpi xmlns:a14="http://schemas.microsoft.com/office/drawing/2010/main" val="0"/>
+              </a:ext>
+            </a:extLst>
+          </a:blip>
+          <a:srcRect t="4456" b="28785"/>
+          <a:stretch/>
+        </p:blipFill>
+        <p:spPr bwMode="auto">
+          <a:xfrm>
+            <a:off x="15" y="10"/>
+            <a:ext cx="12191985" cy="4578340"/>
+          </a:xfrm>
+          <a:prstGeom prst="rect">
+            <a:avLst/>
+          </a:prstGeom>
+          <a:noFill/>
+          <a:extLst>
+            <a:ext uri="{909E8E84-426E-40DD-AFC4-6F175D3DCCD1}">
+              <a14:hiddenFill xmlns:a14="http://schemas.microsoft.com/office/drawing/2010/main">
+                <a:solidFill>
+                  <a:srgbClr val="FFFFFF"/>
+                </a:solidFill>
+              </a14:hiddenFill>
+            </a:ext>
+          </a:extLst>
+        </p:spPr>
+      </p:pic>
       <p:sp>
         <p:nvSpPr>
           <p:cNvPr id="2" name="Title 1">
@@ -5314,40 +6383,22 @@
             <p:ph type="title"/>
           </p:nvPr>
         </p:nvSpPr>
-        <p:spPr/>
-        <p:txBody>
-          <a:bodyPr/>
+        <p:spPr>
+          <a:xfrm>
+            <a:off x="1097279" y="4799362"/>
+            <a:ext cx="10113645" cy="743682"/>
+          </a:xfrm>
+        </p:spPr>
+        <p:txBody>
+          <a:bodyPr anchor="b">
+            <a:normAutofit/>
+          </a:bodyPr>
           <a:lstStyle/>
           <a:p>
             <a:r>
               <a:rPr lang="fr-CA" dirty="0"/>
               <a:t>Problématique</a:t>
             </a:r>
-            <a:endParaRPr lang="en-CA" dirty="0"/>
-          </a:p>
-        </p:txBody>
-      </p:sp>
-      <p:sp>
-        <p:nvSpPr>
-          <p:cNvPr id="3" name="Content Placeholder 2">
-            <a:extLst>
-              <a:ext uri="{FF2B5EF4-FFF2-40B4-BE49-F238E27FC236}">
-                <a16:creationId xmlns:a16="http://schemas.microsoft.com/office/drawing/2014/main" id="{9983E910-59CB-7ECB-46A9-68D73D0A7492}"/>
-              </a:ext>
-            </a:extLst>
-          </p:cNvPr>
-          <p:cNvSpPr>
-            <a:spLocks noGrp="1"/>
-          </p:cNvSpPr>
-          <p:nvPr>
-            <p:ph idx="1"/>
-          </p:nvPr>
-        </p:nvSpPr>
-        <p:spPr/>
-        <p:txBody>
-          <a:bodyPr/>
-          <a:lstStyle/>
-          <a:p>
             <a:endParaRPr lang="en-CA" dirty="0"/>
           </a:p>
         </p:txBody>

</xml_diff>